<commit_message>
New version of the Venn diagram
</commit_message>
<xml_diff>
--- a/TS_basics/TS_ES_JS_Venn_diagram.pptx
+++ b/TS_basics/TS_ES_JS_Venn_diagram.pptx
@@ -104,6 +104,11 @@
       </a:defRPr>
     </a:lvl9pPr>
   </p:defaultTextStyle>
+  <p:extLst>
+    <p:ext uri="{EFAFB233-063F-42B5-8137-9DF3F51BA10A}">
+      <p15:sldGuideLst xmlns:p15="http://schemas.microsoft.com/office/powerpoint/2012/main"/>
+    </p:ext>
+  </p:extLst>
 </p:presentation>
 </file>
 
@@ -3356,8 +3361,8 @@
         </p:nvSpPr>
         <p:spPr>
           <a:xfrm>
-            <a:off x="2690192" y="1351722"/>
-            <a:ext cx="4161182" cy="3719443"/>
+            <a:off x="2686233" y="1056905"/>
+            <a:ext cx="4161182" cy="4034053"/>
           </a:xfrm>
           <a:prstGeom prst="ellipse">
             <a:avLst/>
@@ -3425,8 +3430,8 @@
         </p:nvSpPr>
         <p:spPr>
           <a:xfrm>
-            <a:off x="3953565" y="2407478"/>
-            <a:ext cx="2732157" cy="2453861"/>
+            <a:off x="3862521" y="2236519"/>
+            <a:ext cx="2759952" cy="2644239"/>
           </a:xfrm>
           <a:prstGeom prst="ellipse">
             <a:avLst/>
@@ -3500,8 +3505,8 @@
         </p:nvSpPr>
         <p:spPr>
           <a:xfrm>
-            <a:off x="4505739" y="3485321"/>
-            <a:ext cx="1992243" cy="1250123"/>
+            <a:off x="4283032" y="3356758"/>
+            <a:ext cx="2141518" cy="1397329"/>
           </a:xfrm>
           <a:prstGeom prst="ellipse">
             <a:avLst/>
@@ -3557,7 +3562,7 @@
                   </a:schemeClr>
                 </a:solidFill>
               </a:rPr>
-              <a:t> JavaScript</a:t>
+              <a:t> ES/JavaScript</a:t>
             </a:r>
           </a:p>
           <a:p>

</xml_diff>